<commit_message>
add comments and update presentation
</commit_message>
<xml_diff>
--- a/Assignment_2_Messina_A.pptx
+++ b/Assignment_2_Messina_A.pptx
@@ -226,7 +226,7 @@
           <a:p>
             <a:fld id="{B50C6D45-1599-374C-BDA4-A0B7E2199288}" type="datetimeFigureOut">
               <a:rPr lang="it-IT" smtClean="0"/>
-              <a:t>03/05/25</a:t>
+              <a:t>17/05/25</a:t>
             </a:fld>
             <a:endParaRPr lang="it-IT"/>
           </a:p>
@@ -403,7 +403,7 @@
           <a:p>
             <a:fld id="{10432CCF-CA57-2245-949F-F04A9AC056BF}" type="datetimeFigureOut">
               <a:rPr lang="it-IT" smtClean="0"/>
-              <a:t>03/05/25</a:t>
+              <a:t>17/05/25</a:t>
             </a:fld>
             <a:endParaRPr lang="it-IT"/>
           </a:p>
@@ -1489,7 +1489,7 @@
           <a:p>
             <a:fld id="{48A87A34-81AB-432B-8DAE-1953F412C126}" type="datetimeFigureOut">
               <a:rPr lang="en-US" smtClean="0"/>
-              <a:t>5/3/25</a:t>
+              <a:t>5/17/25</a:t>
             </a:fld>
             <a:endParaRPr lang="en-US" dirty="0"/>
           </a:p>
@@ -1756,7 +1756,7 @@
           <a:p>
             <a:fld id="{48A87A34-81AB-432B-8DAE-1953F412C126}" type="datetimeFigureOut">
               <a:rPr lang="en-US" smtClean="0"/>
-              <a:t>5/3/25</a:t>
+              <a:t>5/17/25</a:t>
             </a:fld>
             <a:endParaRPr lang="en-US" dirty="0"/>
           </a:p>
@@ -1988,7 +1988,7 @@
             <a:fld id="{48A87A34-81AB-432B-8DAE-1953F412C126}" type="datetimeFigureOut">
               <a:rPr lang="en-US" smtClean="0"/>
               <a:pPr/>
-              <a:t>5/3/25</a:t>
+              <a:t>5/17/25</a:t>
             </a:fld>
             <a:endParaRPr lang="en-US" dirty="0"/>
           </a:p>
@@ -2299,7 +2299,7 @@
             <a:fld id="{48A87A34-81AB-432B-8DAE-1953F412C126}" type="datetimeFigureOut">
               <a:rPr lang="en-US" smtClean="0"/>
               <a:pPr/>
-              <a:t>5/3/25</a:t>
+              <a:t>5/17/25</a:t>
             </a:fld>
             <a:endParaRPr lang="en-US" dirty="0"/>
           </a:p>
@@ -2773,7 +2773,7 @@
             <a:fld id="{48A87A34-81AB-432B-8DAE-1953F412C126}" type="datetimeFigureOut">
               <a:rPr lang="en-US" smtClean="0"/>
               <a:pPr/>
-              <a:t>5/3/25</a:t>
+              <a:t>5/17/25</a:t>
             </a:fld>
             <a:endParaRPr lang="en-US" dirty="0"/>
           </a:p>
@@ -3320,7 +3320,7 @@
           <a:p>
             <a:fld id="{48A87A34-81AB-432B-8DAE-1953F412C126}" type="datetimeFigureOut">
               <a:rPr lang="en-US" smtClean="0"/>
-              <a:t>5/3/25</a:t>
+              <a:t>5/17/25</a:t>
             </a:fld>
             <a:endParaRPr lang="en-US" dirty="0"/>
           </a:p>
@@ -4094,7 +4094,7 @@
           <a:p>
             <a:fld id="{48A87A34-81AB-432B-8DAE-1953F412C126}" type="datetimeFigureOut">
               <a:rPr lang="en-US" smtClean="0"/>
-              <a:t>5/3/25</a:t>
+              <a:t>5/17/25</a:t>
             </a:fld>
             <a:endParaRPr lang="en-US" dirty="0"/>
           </a:p>
@@ -4269,7 +4269,7 @@
           <a:p>
             <a:fld id="{48A87A34-81AB-432B-8DAE-1953F412C126}" type="datetimeFigureOut">
               <a:rPr lang="en-US" smtClean="0"/>
-              <a:t>5/3/25</a:t>
+              <a:t>5/17/25</a:t>
             </a:fld>
             <a:endParaRPr lang="en-US" dirty="0"/>
           </a:p>
@@ -4493,7 +4493,7 @@
             <a:fld id="{48A87A34-81AB-432B-8DAE-1953F412C126}" type="datetimeFigureOut">
               <a:rPr lang="en-US" smtClean="0"/>
               <a:pPr/>
-              <a:t>5/3/25</a:t>
+              <a:t>5/17/25</a:t>
             </a:fld>
             <a:endParaRPr lang="en-US" dirty="0"/>
           </a:p>
@@ -4674,7 +4674,7 @@
           <a:p>
             <a:fld id="{48A87A34-81AB-432B-8DAE-1953F412C126}" type="datetimeFigureOut">
               <a:rPr lang="en-US" smtClean="0"/>
-              <a:t>5/3/25</a:t>
+              <a:t>5/17/25</a:t>
             </a:fld>
             <a:endParaRPr lang="en-US" dirty="0"/>
           </a:p>
@@ -4964,7 +4964,7 @@
             <a:fld id="{48A87A34-81AB-432B-8DAE-1953F412C126}" type="datetimeFigureOut">
               <a:rPr lang="en-US" smtClean="0"/>
               <a:pPr/>
-              <a:t>5/3/25</a:t>
+              <a:t>5/17/25</a:t>
             </a:fld>
             <a:endParaRPr lang="en-US" dirty="0"/>
           </a:p>
@@ -5206,7 +5206,7 @@
           <a:p>
             <a:fld id="{48A87A34-81AB-432B-8DAE-1953F412C126}" type="datetimeFigureOut">
               <a:rPr lang="en-US" smtClean="0"/>
-              <a:t>5/3/25</a:t>
+              <a:t>5/17/25</a:t>
             </a:fld>
             <a:endParaRPr lang="en-US" dirty="0"/>
           </a:p>
@@ -5585,7 +5585,7 @@
           <a:p>
             <a:fld id="{48A87A34-81AB-432B-8DAE-1953F412C126}" type="datetimeFigureOut">
               <a:rPr lang="en-US" smtClean="0"/>
-              <a:t>5/3/25</a:t>
+              <a:t>5/17/25</a:t>
             </a:fld>
             <a:endParaRPr lang="en-US" dirty="0"/>
           </a:p>
@@ -5703,7 +5703,7 @@
           <a:p>
             <a:fld id="{48A87A34-81AB-432B-8DAE-1953F412C126}" type="datetimeFigureOut">
               <a:rPr lang="en-US" smtClean="0"/>
-              <a:t>5/3/25</a:t>
+              <a:t>5/17/25</a:t>
             </a:fld>
             <a:endParaRPr lang="en-US" dirty="0"/>
           </a:p>
@@ -5798,7 +5798,7 @@
           <a:p>
             <a:fld id="{48A87A34-81AB-432B-8DAE-1953F412C126}" type="datetimeFigureOut">
               <a:rPr lang="en-US" smtClean="0"/>
-              <a:t>5/3/25</a:t>
+              <a:t>5/17/25</a:t>
             </a:fld>
             <a:endParaRPr lang="en-US" dirty="0"/>
           </a:p>
@@ -6047,7 +6047,7 @@
           <a:p>
             <a:fld id="{48A87A34-81AB-432B-8DAE-1953F412C126}" type="datetimeFigureOut">
               <a:rPr lang="en-US" smtClean="0"/>
-              <a:t>5/3/25</a:t>
+              <a:t>5/17/25</a:t>
             </a:fld>
             <a:endParaRPr lang="en-US" dirty="0"/>
           </a:p>
@@ -6304,7 +6304,7 @@
           <a:p>
             <a:fld id="{48A87A34-81AB-432B-8DAE-1953F412C126}" type="datetimeFigureOut">
               <a:rPr lang="en-US" smtClean="0"/>
-              <a:t>5/3/25</a:t>
+              <a:t>5/17/25</a:t>
             </a:fld>
             <a:endParaRPr lang="en-US" dirty="0"/>
           </a:p>
@@ -6548,7 +6548,7 @@
             <a:fld id="{48A87A34-81AB-432B-8DAE-1953F412C126}" type="datetimeFigureOut">
               <a:rPr lang="en-US" smtClean="0"/>
               <a:pPr/>
-              <a:t>5/3/25</a:t>
+              <a:t>5/17/25</a:t>
             </a:fld>
             <a:endParaRPr lang="en-US" dirty="0"/>
           </a:p>
@@ -7588,10 +7588,7 @@
               <a:rPr lang="it-IT" sz="1400" noProof="0" dirty="0" err="1"/>
               <a:t>preprocessing</a:t>
             </a:r>
-            <a:r>
-              <a:rPr lang="it-IT" sz="1400" noProof="0" dirty="0"/>
-              <a:t>.</a:t>
-            </a:r>
+            <a:endParaRPr lang="it-IT" sz="1400" noProof="0" dirty="0"/>
           </a:p>
           <a:p>
             <a:pPr marL="285750" indent="-285750">
@@ -7608,7 +7605,7 @@
             </a:r>
             <a:r>
               <a:rPr lang="it-IT" sz="1400" noProof="0" dirty="0"/>
-              <a:t> sugli esperimenti: ogni configurazione viene valutata e confrontata automaticamente e la migliore viene salvata.</a:t>
+              <a:t> sugli esperimenti: ogni configurazione viene valutata e confrontata automaticamente e la migliore viene salvata</a:t>
             </a:r>
           </a:p>
           <a:p>
@@ -7626,28 +7623,8 @@
             </a:r>
             <a:r>
               <a:rPr lang="it-IT" sz="1400" noProof="0" dirty="0"/>
-              <a:t>: è possibile aggiungere nuovi metodi LBP, filtri, o modelli con facilità.</a:t>
-            </a:r>
-          </a:p>
-          <a:p>
-            <a:pPr marL="285750" indent="-285750">
-              <a:buFont typeface="Arial" panose="020B0604020202020204" pitchFamily="34" charset="0"/>
-              <a:buChar char="•"/>
-            </a:pPr>
-            <a:endParaRPr lang="it-IT" sz="1400" dirty="0"/>
-          </a:p>
-          <a:p>
-            <a:endParaRPr lang="it-IT" sz="1400" noProof="0" dirty="0"/>
-          </a:p>
-          <a:p>
-            <a:pPr marL="285750" indent="-285750">
-              <a:buFont typeface="Arial" panose="020B0604020202020204" pitchFamily="34" charset="0"/>
-              <a:buChar char="•"/>
-            </a:pPr>
-            <a:endParaRPr lang="it-IT" sz="1400" noProof="0" dirty="0"/>
-          </a:p>
-          <a:p>
-            <a:endParaRPr lang="it-IT" sz="1400" noProof="0" dirty="0"/>
+              <a:t>: è possibile aggiungere nuovi metodi LBP, filtri, o modelli con facilità</a:t>
+            </a:r>
           </a:p>
         </p:txBody>
       </p:sp>
@@ -9397,8 +9374,8 @@
         </p:nvSpPr>
         <p:spPr>
           <a:xfrm>
-            <a:off x="685800" y="764373"/>
-            <a:ext cx="10820400" cy="1293028"/>
+            <a:off x="0" y="764373"/>
+            <a:ext cx="12192000" cy="1293028"/>
           </a:xfrm>
         </p:spPr>
         <p:txBody>
@@ -9431,8 +9408,8 @@
         </p:nvSpPr>
         <p:spPr>
           <a:xfrm>
-            <a:off x="495300" y="2057401"/>
-            <a:ext cx="5600700" cy="4161283"/>
+            <a:off x="419100" y="2057401"/>
+            <a:ext cx="5676900" cy="4161283"/>
           </a:xfrm>
         </p:spPr>
         <p:txBody>
@@ -9462,7 +9439,15 @@
             </a:r>
             <a:r>
               <a:rPr lang="it-IT" sz="1400" noProof="0" dirty="0"/>
-              <a:t>il problema della rilevazione di volti deepfake tramite classificatori supervisionati.</a:t>
+              <a:t>il problema della rilevazione di volti reali e deepfake tramite configurazioni di feature </a:t>
+            </a:r>
+            <a:r>
+              <a:rPr lang="it-IT" sz="1400" noProof="0" dirty="0" err="1"/>
+              <a:t>extraction</a:t>
+            </a:r>
+            <a:r>
+              <a:rPr lang="it-IT" sz="1400" noProof="0" dirty="0"/>
+              <a:t> e classificatori supervisionati.</a:t>
             </a:r>
           </a:p>
           <a:p>
@@ -9487,11 +9472,11 @@
             </a:r>
             <a:r>
               <a:rPr lang="it-IT" sz="1400" noProof="0" dirty="0" err="1"/>
-              <a:t>preprocessing</a:t>
+              <a:t>pre</a:t>
             </a:r>
             <a:r>
               <a:rPr lang="it-IT" sz="1400" noProof="0" dirty="0"/>
-              <a:t> non invasivo (es. filtro Gaussiano) e scaling, si è dimostrato </a:t>
+              <a:t>-processing non invasivo (es. filtro Gaussiano) e scaling, si è dimostrato </a:t>
             </a:r>
             <a:r>
               <a:rPr lang="it-IT" sz="1400" noProof="0" dirty="0">
@@ -9569,9 +9554,8 @@
             </a:r>
             <a:r>
               <a:rPr lang="it-IT" sz="1400" noProof="0" dirty="0"/>
-              <a:t> e non ha l’effetto "black box" come presente ad esempio sulle reti neurali CNN.</a:t>
-            </a:r>
-            <a:endParaRPr lang="it-IT" sz="1600" noProof="0" dirty="0"/>
+              <a:t> e non ha l’effetto black box caratteristico di altre soluzioni.</a:t>
+            </a:r>
           </a:p>
           <a:p>
             <a:pPr marL="285750" indent="-285750">
@@ -9594,8 +9578,28 @@
               <a:t>riproducibile e configurabile</a:t>
             </a:r>
             <a:r>
+              <a:rPr lang="it-IT" sz="1400" dirty="0">
+                <a:solidFill>
+                  <a:schemeClr val="accent1"/>
+                </a:solidFill>
+              </a:rPr>
+              <a:t> </a:t>
+            </a:r>
+            <a:r>
               <a:rPr lang="it-IT" sz="1400" noProof="0" dirty="0"/>
-              <a:t>, con supporto per l’inferenza su immagini reali.</a:t>
+              <a:t>grazie ai modelli </a:t>
+            </a:r>
+            <a:r>
+              <a:rPr lang="it-IT" sz="1400" dirty="0" err="1"/>
+              <a:t>joblib</a:t>
+            </a:r>
+            <a:r>
+              <a:rPr lang="it-IT" sz="1400" dirty="0"/>
+              <a:t>, </a:t>
+            </a:r>
+            <a:r>
+              <a:rPr lang="it-IT" sz="1400" noProof="0" dirty="0"/>
+              <a:t>con supporto per l’inferenza su immagini reali.</a:t>
             </a:r>
           </a:p>
           <a:p>
@@ -9651,15 +9655,39 @@
         </p:nvSpPr>
         <p:spPr>
           <a:xfrm>
-            <a:off x="6172200" y="2057401"/>
-            <a:ext cx="5600700" cy="4161283"/>
+            <a:off x="6096000" y="2057401"/>
+            <a:ext cx="5676900" cy="4161283"/>
           </a:xfrm>
         </p:spPr>
         <p:txBody>
           <a:bodyPr>
-            <a:normAutofit/>
+            <a:noAutofit/>
           </a:bodyPr>
           <a:lstStyle/>
+          <a:p>
+            <a:pPr marL="0" indent="0">
+              <a:buClr>
+                <a:schemeClr val="accent1"/>
+              </a:buClr>
+              <a:buNone/>
+            </a:pPr>
+            <a:r>
+              <a:rPr lang="it-IT" sz="1400" noProof="0" dirty="0"/>
+              <a:t>Oltre ai risultati ottenuti, il progetto apre interessanti prospettive per </a:t>
+            </a:r>
+            <a:r>
+              <a:rPr lang="it-IT" sz="1400" noProof="0" dirty="0">
+                <a:solidFill>
+                  <a:schemeClr val="accent1"/>
+                </a:solidFill>
+              </a:rPr>
+              <a:t>sviluppi futuri</a:t>
+            </a:r>
+            <a:r>
+              <a:rPr lang="it-IT" sz="1400" noProof="0" dirty="0"/>
+              <a:t>:</a:t>
+            </a:r>
+          </a:p>
           <a:p>
             <a:pPr>
               <a:buClr>
@@ -9667,149 +9695,217 @@
               </a:buClr>
             </a:pPr>
             <a:r>
+              <a:rPr lang="it-IT" sz="1400" noProof="0" dirty="0">
+                <a:solidFill>
+                  <a:schemeClr val="accent1"/>
+                </a:solidFill>
+              </a:rPr>
+              <a:t>Espansione del dataset</a:t>
+            </a:r>
+            <a:r>
               <a:rPr lang="it-IT" sz="1400" noProof="0" dirty="0"/>
-              <a:t>Oltre ai risultati ottenuti, il progetto apre interessanti prospettive per </a:t>
-            </a:r>
-            <a:r>
-              <a:rPr lang="it-IT" sz="1400" noProof="0" dirty="0">
-                <a:solidFill>
-                  <a:schemeClr val="accent1"/>
-                </a:solidFill>
-              </a:rPr>
-              <a:t>sviluppi futuri</a:t>
-            </a:r>
-            <a:r>
-              <a:rPr lang="it-IT" sz="1400" noProof="0" dirty="0"/>
-              <a:t>:</a:t>
-            </a:r>
-          </a:p>
-          <a:p>
-            <a:pPr lvl="1">
+              <a:t>: utilizzare più immagini reali e fake provenienti da fonti eterogenee.</a:t>
+            </a:r>
+          </a:p>
+          <a:p>
+            <a:pPr>
               <a:buClr>
                 <a:schemeClr val="accent1"/>
               </a:buClr>
             </a:pPr>
             <a:r>
+              <a:rPr lang="it-IT" sz="1400" noProof="0" dirty="0"/>
+              <a:t>Aumentare la </a:t>
+            </a:r>
+            <a:r>
               <a:rPr lang="it-IT" sz="1400" noProof="0" dirty="0">
                 <a:solidFill>
                   <a:schemeClr val="accent1"/>
                 </a:solidFill>
               </a:rPr>
-              <a:t>Espansione del dataset</a:t>
+              <a:t>varietà del dataset </a:t>
             </a:r>
             <a:r>
               <a:rPr lang="it-IT" sz="1400" noProof="0" dirty="0"/>
-              <a:t>: utilizzare più immagini reali e fake provenienti da fonti eterogenee.</a:t>
-            </a:r>
-          </a:p>
-          <a:p>
-            <a:pPr lvl="1">
+              <a:t>in termini di etnia, età, illuminazione, angolazione e generi per evitare bias.</a:t>
+            </a:r>
+          </a:p>
+          <a:p>
+            <a:pPr>
               <a:buClr>
                 <a:schemeClr val="accent1"/>
               </a:buClr>
             </a:pPr>
             <a:r>
-              <a:rPr lang="it-IT" sz="1400" noProof="0" dirty="0"/>
-              <a:t>Aumentare la </a:t>
-            </a:r>
-            <a:r>
-              <a:rPr lang="it-IT" sz="1400" noProof="0" dirty="0">
+              <a:rPr lang="it-IT" sz="1400" dirty="0">
                 <a:solidFill>
                   <a:schemeClr val="accent1"/>
                 </a:solidFill>
               </a:rPr>
-              <a:t>varietà del dataset </a:t>
-            </a:r>
-            <a:r>
-              <a:rPr lang="it-IT" sz="1400" noProof="0" dirty="0"/>
-              <a:t>in termini di etnia, età, illuminazione, angolazione e generi per evitare bias.</a:t>
-            </a:r>
-          </a:p>
-          <a:p>
-            <a:pPr lvl="1">
+              <a:t>Splittare equamente </a:t>
+            </a:r>
+            <a:r>
+              <a:rPr lang="it-IT" sz="1400" dirty="0"/>
+              <a:t>soggetti Real e Fake.</a:t>
+            </a:r>
+            <a:endParaRPr lang="it-IT" sz="1400" noProof="0" dirty="0"/>
+          </a:p>
+          <a:p>
+            <a:pPr>
               <a:buClr>
                 <a:schemeClr val="accent1"/>
               </a:buClr>
             </a:pPr>
             <a:r>
+              <a:rPr lang="it-IT" sz="1400" noProof="0" dirty="0"/>
+              <a:t>Utilizzare </a:t>
+            </a:r>
+            <a:r>
+              <a:rPr lang="it-IT" sz="1400" noProof="0" dirty="0">
+                <a:solidFill>
+                  <a:schemeClr val="accent1"/>
+                </a:solidFill>
+              </a:rPr>
+              <a:t>Cross-</a:t>
+            </a:r>
+            <a:r>
+              <a:rPr lang="it-IT" sz="1400" noProof="0" dirty="0" err="1">
+                <a:solidFill>
+                  <a:schemeClr val="accent1"/>
+                </a:solidFill>
+              </a:rPr>
+              <a:t>validation</a:t>
+            </a:r>
+            <a:r>
+              <a:rPr lang="it-IT" sz="1400" noProof="0" dirty="0">
+                <a:solidFill>
+                  <a:schemeClr val="accent1"/>
+                </a:solidFill>
+              </a:rPr>
+              <a:t> k-</a:t>
+            </a:r>
+            <a:r>
+              <a:rPr lang="it-IT" sz="1400" noProof="0" dirty="0" err="1">
+                <a:solidFill>
+                  <a:schemeClr val="accent1"/>
+                </a:solidFill>
+              </a:rPr>
+              <a:t>fold</a:t>
+            </a:r>
+            <a:r>
               <a:rPr lang="it-IT" sz="1400" dirty="0">
                 <a:solidFill>
                   <a:schemeClr val="accent1"/>
                 </a:solidFill>
               </a:rPr>
-              <a:t>Splittare equamente </a:t>
+              <a:t> </a:t>
             </a:r>
             <a:r>
               <a:rPr lang="it-IT" sz="1400" dirty="0"/>
-              <a:t>soggetti Real e Fake.</a:t>
-            </a:r>
-            <a:endParaRPr lang="it-IT" sz="1400" noProof="0" dirty="0"/>
-          </a:p>
-          <a:p>
-            <a:pPr lvl="1">
+              <a:t>al posto di un </a:t>
+            </a:r>
+            <a:r>
+              <a:rPr lang="it-IT" sz="1400" dirty="0" err="1"/>
+              <a:t>validation</a:t>
+            </a:r>
+            <a:r>
+              <a:rPr lang="it-IT" sz="1400" dirty="0"/>
+              <a:t> split fisso per una stima più affidabile delle performance dei modelli.</a:t>
+            </a:r>
+          </a:p>
+          <a:p>
+            <a:pPr>
               <a:buClr>
                 <a:schemeClr val="accent1"/>
               </a:buClr>
             </a:pPr>
             <a:r>
+              <a:rPr lang="it-IT" sz="1400" noProof="0" dirty="0">
+                <a:solidFill>
+                  <a:schemeClr val="accent1"/>
+                </a:solidFill>
+              </a:rPr>
+              <a:t>Ottimizzazione degli </a:t>
+            </a:r>
+            <a:r>
+              <a:rPr lang="it-IT" sz="1400" noProof="0" dirty="0" err="1">
+                <a:solidFill>
+                  <a:schemeClr val="accent1"/>
+                </a:solidFill>
+              </a:rPr>
+              <a:t>iperparametri</a:t>
+            </a:r>
+            <a:r>
+              <a:rPr lang="it-IT" sz="1400" dirty="0">
+                <a:solidFill>
+                  <a:schemeClr val="accent1"/>
+                </a:solidFill>
+              </a:rPr>
+              <a:t> </a:t>
+            </a:r>
+            <a:r>
+              <a:rPr lang="it-IT" sz="1400" dirty="0"/>
+              <a:t>con ricerca</a:t>
+            </a:r>
+            <a:r>
               <a:rPr lang="it-IT" sz="1400" noProof="0" dirty="0"/>
-              <a:t>Utilizzare </a:t>
-            </a:r>
-            <a:r>
-              <a:rPr lang="it-IT" sz="1400" noProof="0" dirty="0">
-                <a:solidFill>
-                  <a:schemeClr val="accent1"/>
-                </a:solidFill>
-              </a:rPr>
-              <a:t>Cross-</a:t>
-            </a:r>
-            <a:r>
-              <a:rPr lang="it-IT" sz="1400" noProof="0" dirty="0" err="1">
-                <a:solidFill>
-                  <a:schemeClr val="accent1"/>
-                </a:solidFill>
-              </a:rPr>
-              <a:t>validation</a:t>
-            </a:r>
-            <a:r>
-              <a:rPr lang="it-IT" sz="1400" noProof="0" dirty="0">
-                <a:solidFill>
-                  <a:schemeClr val="accent1"/>
-                </a:solidFill>
-              </a:rPr>
-              <a:t> k-</a:t>
-            </a:r>
-            <a:r>
-              <a:rPr lang="it-IT" sz="1400" noProof="0" dirty="0" err="1">
-                <a:solidFill>
-                  <a:schemeClr val="accent1"/>
-                </a:solidFill>
-              </a:rPr>
-              <a:t>fold</a:t>
-            </a:r>
-            <a:r>
-              <a:rPr lang="it-IT" sz="1400" dirty="0">
-                <a:solidFill>
-                  <a:schemeClr val="accent1"/>
-                </a:solidFill>
-              </a:rPr>
+              <a:t> automatica (</a:t>
+            </a:r>
+            <a:r>
+              <a:rPr lang="it-IT" sz="1400" noProof="0" dirty="0" err="1"/>
+              <a:t>GridSearch</a:t>
+            </a:r>
+            <a:r>
+              <a:rPr lang="it-IT" sz="1400" noProof="0" dirty="0"/>
+              <a:t>, </a:t>
+            </a:r>
+            <a:r>
+              <a:rPr lang="it-IT" sz="1400" noProof="0" dirty="0" err="1"/>
+              <a:t>RandomSearch</a:t>
+            </a:r>
+            <a:r>
+              <a:rPr lang="it-IT" sz="1400" noProof="0" dirty="0"/>
+              <a:t>) di combinazioni di </a:t>
+            </a:r>
+            <a:r>
+              <a:rPr lang="it-IT" sz="1400" dirty="0" err="1"/>
+              <a:t>P</a:t>
+            </a:r>
+            <a:r>
+              <a:rPr lang="it-IT" sz="1400" noProof="0" dirty="0"/>
+              <a:t>,</a:t>
+            </a:r>
+            <a:r>
+              <a:rPr lang="it-IT" sz="1400" dirty="0"/>
               <a:t> </a:t>
             </a:r>
             <a:r>
-              <a:rPr lang="it-IT" sz="1400" dirty="0"/>
-              <a:t>al posto di un </a:t>
-            </a:r>
-            <a:r>
               <a:rPr lang="it-IT" sz="1400" dirty="0" err="1"/>
-              <a:t>validation</a:t>
-            </a:r>
-            <a:r>
-              <a:rPr lang="it-IT" sz="1400" dirty="0"/>
-              <a:t> split fisso per una stima più affidabile delle performance dei modelli.</a:t>
-            </a:r>
-          </a:p>
-          <a:p>
-            <a:pPr lvl="1">
+              <a:t>R</a:t>
+            </a:r>
+            <a:r>
+              <a:rPr lang="it-IT" sz="1400" noProof="0" dirty="0"/>
+              <a:t>, </a:t>
+            </a:r>
+            <a:r>
+              <a:rPr lang="it-IT" sz="1400" noProof="0" dirty="0" err="1"/>
+              <a:t>method</a:t>
+            </a:r>
+            <a:r>
+              <a:rPr lang="it-IT" sz="1400" noProof="0" dirty="0"/>
+              <a:t>, </a:t>
+            </a:r>
+            <a:r>
+              <a:rPr lang="it-IT" sz="1400" noProof="0" dirty="0" err="1"/>
+              <a:t>scaler</a:t>
+            </a:r>
+            <a:r>
+              <a:rPr lang="it-IT" sz="1400" noProof="0" dirty="0"/>
+              <a:t>, filtri, ecc.</a:t>
+            </a:r>
+          </a:p>
+          <a:p>
+            <a:pPr>
               <a:buClr>
                 <a:schemeClr val="accent1"/>
               </a:buClr>
@@ -9820,117 +9916,22 @@
                   <a:schemeClr val="accent1"/>
                 </a:solidFill>
               </a:rPr>
-              <a:t>Ottimizzazione degli </a:t>
-            </a:r>
-            <a:r>
-              <a:rPr lang="it-IT" sz="1400" noProof="0" dirty="0" err="1">
-                <a:solidFill>
-                  <a:schemeClr val="accent1"/>
-                </a:solidFill>
-              </a:rPr>
-              <a:t>iperparametri</a:t>
-            </a:r>
-            <a:r>
-              <a:rPr lang="it-IT" sz="1400" dirty="0">
-                <a:solidFill>
-                  <a:schemeClr val="accent1"/>
-                </a:solidFill>
-              </a:rPr>
-              <a:t> </a:t>
-            </a:r>
-            <a:r>
-              <a:rPr lang="it-IT" sz="1400" dirty="0"/>
-              <a:t>con </a:t>
-            </a:r>
-            <a:r>
-              <a:rPr lang="it-IT" sz="1400" dirty="0" err="1"/>
-              <a:t>r</a:t>
-            </a:r>
-            <a:r>
-              <a:rPr lang="it-IT" sz="1400" noProof="0" dirty="0" err="1"/>
-              <a:t>icerca</a:t>
+              <a:t>Allineamento facciale </a:t>
             </a:r>
             <a:r>
               <a:rPr lang="it-IT" sz="1400" noProof="0" dirty="0"/>
-              <a:t> automatica (</a:t>
-            </a:r>
-            <a:r>
-              <a:rPr lang="it-IT" sz="1400" noProof="0" dirty="0" err="1"/>
-              <a:t>GridSearch</a:t>
-            </a:r>
-            <a:r>
-              <a:rPr lang="it-IT" sz="1400" noProof="0" dirty="0"/>
-              <a:t>, </a:t>
-            </a:r>
-            <a:r>
-              <a:rPr lang="it-IT" sz="1400" noProof="0" dirty="0" err="1"/>
-              <a:t>RandomSearch</a:t>
-            </a:r>
-            <a:r>
-              <a:rPr lang="it-IT" sz="1400" noProof="0" dirty="0"/>
-              <a:t>) di combinazioni di </a:t>
-            </a:r>
-            <a:r>
-              <a:rPr lang="it-IT" sz="1400" noProof="0" dirty="0" err="1"/>
-              <a:t>P</a:t>
-            </a:r>
-            <a:r>
-              <a:rPr lang="it-IT" sz="1400" noProof="0" dirty="0"/>
-              <a:t>, </a:t>
-            </a:r>
-            <a:r>
-              <a:rPr lang="it-IT" sz="1400" noProof="0" dirty="0" err="1"/>
-              <a:t>R</a:t>
-            </a:r>
-            <a:r>
-              <a:rPr lang="it-IT" sz="1400" noProof="0" dirty="0"/>
-              <a:t>, </a:t>
-            </a:r>
-            <a:r>
-              <a:rPr lang="it-IT" sz="1400" noProof="0" dirty="0" err="1"/>
-              <a:t>method</a:t>
-            </a:r>
-            <a:r>
-              <a:rPr lang="it-IT" sz="1400" noProof="0" dirty="0"/>
-              <a:t>, </a:t>
-            </a:r>
-            <a:r>
-              <a:rPr lang="it-IT" sz="1400" noProof="0" dirty="0" err="1"/>
-              <a:t>scaler</a:t>
-            </a:r>
-            <a:r>
-              <a:rPr lang="it-IT" sz="1400" noProof="0" dirty="0"/>
-              <a:t>, filtri, ecc.</a:t>
-            </a:r>
-          </a:p>
-          <a:p>
-            <a:pPr lvl="1">
+              <a:t>e normalizzazione pose/illuminazione</a:t>
+            </a:r>
+          </a:p>
+          <a:p>
+            <a:pPr>
               <a:buClr>
                 <a:schemeClr val="accent1"/>
               </a:buClr>
             </a:pPr>
             <a:r>
-              <a:rPr lang="it-IT" sz="1400" noProof="0" dirty="0">
-                <a:solidFill>
-                  <a:schemeClr val="accent1"/>
-                </a:solidFill>
-              </a:rPr>
-              <a:t>Allineamento facciale </a:t>
-            </a:r>
-            <a:r>
               <a:rPr lang="it-IT" sz="1400" noProof="0" dirty="0"/>
-              <a:t>e normalizzazione pose/illuminazione</a:t>
-            </a:r>
-          </a:p>
-          <a:p>
-            <a:pPr lvl="1">
-              <a:buClr>
-                <a:schemeClr val="accent1"/>
-              </a:buClr>
-            </a:pPr>
-            <a:r>
-              <a:rPr lang="it-IT" sz="1400" noProof="0" dirty="0"/>
-              <a:t>Combinare LBP con Reti Neurali (CNN)</a:t>
+              <a:t>Combinare LBP con deep learning per prescindere dalle sole feature locali.</a:t>
             </a:r>
           </a:p>
         </p:txBody>
@@ -10939,15 +10940,15 @@
             </a:pPr>
             <a:r>
               <a:rPr lang="it-IT" sz="1400" noProof="0" dirty="0"/>
-              <a:t>Mentre le immagini deepfake vengono fornite con il ritaglio nel volto </a:t>
+              <a:t>Mentre le immagini deepfake vengono fornite con il volto ritagliato</a:t>
             </a:r>
             <a:r>
               <a:rPr lang="it-IT" sz="1400" dirty="0"/>
-              <a:t>identificato, l</a:t>
+              <a:t>, l</a:t>
             </a:r>
             <a:r>
               <a:rPr lang="it-IT" sz="1400" noProof="0" dirty="0"/>
-              <a:t>e immagini reali non lo sono. Per queste è stata sviluppata una funzione di </a:t>
+              <a:t>e immagini reali no. Per queste è stata sviluppata una funzione di </a:t>
             </a:r>
             <a:r>
               <a:rPr lang="it-IT" sz="1400" noProof="0" dirty="0" err="1"/>
@@ -10984,10 +10985,7 @@
               </a:rPr>
               <a:t>Lettura immagine</a:t>
             </a:r>
-            <a:r>
-              <a:rPr lang="it-IT" sz="1400" noProof="0" dirty="0"/>
-              <a:t>.</a:t>
-            </a:r>
+            <a:endParaRPr lang="it-IT" sz="1400" noProof="0" dirty="0"/>
           </a:p>
           <a:p>
             <a:pPr marL="342900" indent="-342900">
@@ -11025,10 +11023,7 @@
               <a:rPr lang="it-IT" sz="1400" noProof="0" dirty="0" err="1"/>
               <a:t>Cascade</a:t>
             </a:r>
-            <a:r>
-              <a:rPr lang="it-IT" sz="1400" noProof="0" dirty="0"/>
-              <a:t>.</a:t>
-            </a:r>
+            <a:endParaRPr lang="it-IT" sz="1400" noProof="0" dirty="0"/>
           </a:p>
           <a:p>
             <a:pPr marL="342900" indent="-342900">
@@ -11054,10 +11049,7 @@
               <a:rPr lang="it-IT" sz="1400" dirty="0"/>
               <a:t>g box dello step precedente</a:t>
             </a:r>
-            <a:r>
-              <a:rPr lang="it-IT" sz="1400" noProof="0" dirty="0"/>
-              <a:t>.</a:t>
-            </a:r>
+            <a:endParaRPr lang="it-IT" sz="1400" noProof="0" dirty="0"/>
           </a:p>
           <a:p>
             <a:pPr marL="342900" indent="-342900">
@@ -11073,7 +11065,7 @@
             </a:r>
             <a:r>
               <a:rPr lang="it-IT" sz="1400" noProof="0" dirty="0"/>
-              <a:t> immagine </a:t>
+              <a:t> immagine</a:t>
             </a:r>
           </a:p>
           <a:p>
@@ -11608,7 +11600,7 @@
             </a:pPr>
             <a:r>
               <a:rPr lang="it-IT" sz="1400" noProof="0" dirty="0"/>
-              <a:t>Nel caso in esame, per ridurre lievemente il rumore mantenendo intatte le texture utili alla classificazione, è stato un </a:t>
+              <a:t>Nel caso in esame, per ridurre lievemente il rumore mantenendo intatte le texture utili alla classificazione, è stato utilizzato un </a:t>
             </a:r>
             <a:r>
               <a:rPr lang="it-IT" sz="1400" noProof="0" dirty="0">
@@ -12531,10 +12523,7 @@
               <a:rPr lang="it-IT" sz="1400" noProof="0" dirty="0"/>
               <a:t> nei contorni facciali</a:t>
             </a:r>
-            <a:r>
-              <a:rPr lang="it-IT" sz="1400" dirty="0"/>
-              <a:t>.</a:t>
-            </a:r>
+            <a:endParaRPr lang="it-IT" sz="1400" dirty="0"/>
           </a:p>
           <a:p>
             <a:r>
@@ -12547,7 +12536,7 @@
             </a:r>
             <a:r>
               <a:rPr lang="it-IT" sz="1400" noProof="0" dirty="0"/>
-              <a:t> sfumate non naturali.</a:t>
+              <a:t> sfumate non naturali</a:t>
             </a:r>
           </a:p>
           <a:p>
@@ -12573,7 +12562,7 @@
             </a:r>
             <a:r>
               <a:rPr lang="it-IT" sz="1400" noProof="0" dirty="0"/>
-              <a:t>nelle espressioni.</a:t>
+              <a:t>nelle espressioni</a:t>
             </a:r>
           </a:p>
           <a:p>
@@ -12592,7 +12581,7 @@
             </a:pPr>
             <a:r>
               <a:rPr lang="it-IT" sz="1400" noProof="0" dirty="0"/>
-              <a:t>Per ogni immagine del dataset, come da requisito, sono state estratte le feature utilizzando il Local </a:t>
+              <a:t>Per ogni immagine del dataset sono state estratte le feature utilizzando il Local </a:t>
             </a:r>
             <a:r>
               <a:rPr lang="it-IT" sz="1400" noProof="0" dirty="0" err="1"/>
@@ -12600,7 +12589,15 @@
             </a:r>
             <a:r>
               <a:rPr lang="it-IT" sz="1400" noProof="0" dirty="0"/>
-              <a:t> Pattern (LBP) in due configurazioni:</a:t>
+              <a:t> Pattern (LBP) in due configurazioni</a:t>
+            </a:r>
+            <a:r>
+              <a:rPr lang="it-IT" sz="1400" dirty="0"/>
+              <a:t>,</a:t>
+            </a:r>
+            <a:r>
+              <a:rPr lang="it-IT" sz="1400" noProof="0" dirty="0"/>
+              <a:t> come da requisito:</a:t>
             </a:r>
           </a:p>
           <a:p>
@@ -12638,7 +12635,7 @@
             </a:r>
             <a:r>
               <a:rPr lang="it-IT" sz="1400" noProof="0" dirty="0"/>
-              <a:t>=256.</a:t>
+              <a:t>=256</a:t>
             </a:r>
           </a:p>
           <a:p>
@@ -12684,7 +12681,7 @@
             </a:r>
             <a:r>
               <a:rPr lang="it-IT" sz="1400" noProof="0" dirty="0"/>
-              <a:t>=256.</a:t>
+              <a:t>=256</a:t>
             </a:r>
           </a:p>
           <a:p>
@@ -13951,7 +13948,7 @@
             </a:r>
             <a:r>
               <a:rPr lang="it-IT" sz="1400" noProof="0" dirty="0"/>
-              <a:t>di appartenenza a ciascuna classe tramite la funzione logistica; molto veloce da addestrare e offre coefficienti interpretabili.</a:t>
+              <a:t>di appartenenza a ciascuna classe tramite la funzione logistica; molto veloce da addestrare e da configurare.</a:t>
             </a:r>
           </a:p>
           <a:p>
@@ -14055,7 +14052,19 @@
             </a:r>
             <a:r>
               <a:rPr lang="it-IT" sz="1400" noProof="0" dirty="0"/>
-              <a:t>costruiti su sotto‐campioni casuali dei dati e delle feature; cattura relazioni non lineari ed è meno sensibile agli outlier, senza necessità di scaling.</a:t>
+              <a:t>costruiti su sotto‐campioni casuali dei dati e delle feature; cattura </a:t>
+            </a:r>
+            <a:r>
+              <a:rPr lang="it-IT" sz="1400" noProof="0" dirty="0">
+                <a:solidFill>
+                  <a:schemeClr val="accent1"/>
+                </a:solidFill>
+              </a:rPr>
+              <a:t>relazioni non lineari </a:t>
+            </a:r>
+            <a:r>
+              <a:rPr lang="it-IT" sz="1400" noProof="0" dirty="0"/>
+              <a:t>ed è meno sensibile agli outlier, senza necessità di scaling.</a:t>
             </a:r>
           </a:p>
           <a:p>
@@ -14376,7 +14385,7 @@
             </a:r>
             <a:r>
               <a:rPr lang="it-IT" sz="1400" dirty="0"/>
-              <a:t>) per favorire la confrontabilità delle feature a prescindere dalla scala. Viene calcolato sulla media e varianza dei dati di test e applicato in tutti evitando data leakage.</a:t>
+              <a:t>) per favorire la confrontabilità delle feature a prescindere dalla scala. Viene calcolato sulla media e varianza dei dati di test e applicato in tutti i set, evitando data leakage.</a:t>
             </a:r>
           </a:p>
           <a:p>
@@ -15637,10 +15646,7 @@
               <a:rPr lang="it-IT" sz="1400" noProof="0" dirty="0" err="1"/>
               <a:t>scaler</a:t>
             </a:r>
-            <a:r>
-              <a:rPr lang="it-IT" sz="1400" noProof="0" dirty="0"/>
-              <a:t>.</a:t>
-            </a:r>
+            <a:endParaRPr lang="it-IT" sz="1400" noProof="0" dirty="0"/>
           </a:p>
           <a:p>
             <a:pPr marL="342900" indent="-342900">
@@ -15696,7 +15702,7 @@
             </a:r>
             <a:r>
               <a:rPr lang="it-IT" sz="1400" noProof="0" dirty="0"/>
-              <a:t>dell’immagine.</a:t>
+              <a:t>dell’immagine</a:t>
             </a:r>
           </a:p>
           <a:p>
@@ -15714,7 +15720,7 @@
             </a:r>
             <a:r>
               <a:rPr lang="it-IT" sz="1400" noProof="0" dirty="0"/>
-              <a:t>custom per ridurre il rumore.</a:t>
+              <a:t>custom per ridurre il rumore</a:t>
             </a:r>
           </a:p>
           <a:p>
@@ -15732,7 +15738,7 @@
             </a:r>
             <a:r>
               <a:rPr lang="it-IT" sz="1400" noProof="0" dirty="0"/>
-              <a:t>basato sulla posizione degli occhi.</a:t>
+              <a:t>basato sulla posizione degli occhi</a:t>
             </a:r>
           </a:p>
           <a:p>
@@ -15750,7 +15756,7 @@
             </a:r>
             <a:r>
               <a:rPr lang="it-IT" sz="1400" noProof="0" dirty="0"/>
-              <a:t>con medesime configurazioni usate nel training.</a:t>
+              <a:t>con medesime configurazioni usate nel training</a:t>
             </a:r>
           </a:p>
           <a:p>
@@ -15773,10 +15779,7 @@
               </a:rPr>
               <a:t>predizione della classe</a:t>
             </a:r>
-            <a:r>
-              <a:rPr lang="it-IT" sz="1400" noProof="0" dirty="0"/>
-              <a:t>.</a:t>
-            </a:r>
+            <a:endParaRPr lang="it-IT" sz="1400" noProof="0" dirty="0"/>
           </a:p>
           <a:p>
             <a:pPr marL="342900" indent="-342900">
@@ -15793,7 +15796,7 @@
             </a:r>
             <a:r>
               <a:rPr lang="it-IT" sz="1400" noProof="0" dirty="0"/>
-              <a:t>annotata con le classi predette per ogni volto individuato.</a:t>
+              <a:t>annotata con le classi predette per ogni volto individuato</a:t>
             </a:r>
           </a:p>
         </p:txBody>

</xml_diff>